<commit_message>
added rest api openapi definition
</commit_message>
<xml_diff>
--- a/planung/Fachgespraech.pptx
+++ b/planung/Fachgespraech.pptx
@@ -19,9 +19,11 @@
     <p:sldId id="263" r:id="rId13"/>
     <p:sldId id="264" r:id="rId14"/>
     <p:sldId id="267" r:id="rId15"/>
-    <p:sldId id="269" r:id="rId16"/>
-    <p:sldId id="268" r:id="rId17"/>
-    <p:sldId id="270" r:id="rId18"/>
+    <p:sldId id="274" r:id="rId16"/>
+    <p:sldId id="275" r:id="rId17"/>
+    <p:sldId id="269" r:id="rId18"/>
+    <p:sldId id="268" r:id="rId19"/>
+    <p:sldId id="270" r:id="rId20"/>
   </p:sldIdLst>
   <p:sldSz cx="12192000" cy="6858000"/>
   <p:notesSz cx="6858000" cy="9144000"/>
@@ -275,7 +277,7 @@
           <a:p>
             <a:fld id="{E4780573-CD1C-4620-A951-667904371759}" type="datetimeFigureOut">
               <a:rPr lang="de-DE" smtClean="0"/>
-              <a:t>06.11.2023</a:t>
+              <a:t>13.11.2023</a:t>
             </a:fld>
             <a:endParaRPr lang="de-DE"/>
           </a:p>
@@ -473,7 +475,7 @@
           <a:p>
             <a:fld id="{E4780573-CD1C-4620-A951-667904371759}" type="datetimeFigureOut">
               <a:rPr lang="de-DE" smtClean="0"/>
-              <a:t>06.11.2023</a:t>
+              <a:t>13.11.2023</a:t>
             </a:fld>
             <a:endParaRPr lang="de-DE"/>
           </a:p>
@@ -681,7 +683,7 @@
           <a:p>
             <a:fld id="{E4780573-CD1C-4620-A951-667904371759}" type="datetimeFigureOut">
               <a:rPr lang="de-DE" smtClean="0"/>
-              <a:t>06.11.2023</a:t>
+              <a:t>13.11.2023</a:t>
             </a:fld>
             <a:endParaRPr lang="de-DE"/>
           </a:p>
@@ -879,7 +881,7 @@
           <a:p>
             <a:fld id="{E4780573-CD1C-4620-A951-667904371759}" type="datetimeFigureOut">
               <a:rPr lang="de-DE" smtClean="0"/>
-              <a:t>06.11.2023</a:t>
+              <a:t>13.11.2023</a:t>
             </a:fld>
             <a:endParaRPr lang="de-DE"/>
           </a:p>
@@ -1154,7 +1156,7 @@
           <a:p>
             <a:fld id="{E4780573-CD1C-4620-A951-667904371759}" type="datetimeFigureOut">
               <a:rPr lang="de-DE" smtClean="0"/>
-              <a:t>06.11.2023</a:t>
+              <a:t>13.11.2023</a:t>
             </a:fld>
             <a:endParaRPr lang="de-DE"/>
           </a:p>
@@ -1419,7 +1421,7 @@
           <a:p>
             <a:fld id="{E4780573-CD1C-4620-A951-667904371759}" type="datetimeFigureOut">
               <a:rPr lang="de-DE" smtClean="0"/>
-              <a:t>06.11.2023</a:t>
+              <a:t>13.11.2023</a:t>
             </a:fld>
             <a:endParaRPr lang="de-DE"/>
           </a:p>
@@ -1831,7 +1833,7 @@
           <a:p>
             <a:fld id="{E4780573-CD1C-4620-A951-667904371759}" type="datetimeFigureOut">
               <a:rPr lang="de-DE" smtClean="0"/>
-              <a:t>06.11.2023</a:t>
+              <a:t>13.11.2023</a:t>
             </a:fld>
             <a:endParaRPr lang="de-DE"/>
           </a:p>
@@ -1972,7 +1974,7 @@
           <a:p>
             <a:fld id="{E4780573-CD1C-4620-A951-667904371759}" type="datetimeFigureOut">
               <a:rPr lang="de-DE" smtClean="0"/>
-              <a:t>06.11.2023</a:t>
+              <a:t>13.11.2023</a:t>
             </a:fld>
             <a:endParaRPr lang="de-DE"/>
           </a:p>
@@ -2085,7 +2087,7 @@
           <a:p>
             <a:fld id="{E4780573-CD1C-4620-A951-667904371759}" type="datetimeFigureOut">
               <a:rPr lang="de-DE" smtClean="0"/>
-              <a:t>06.11.2023</a:t>
+              <a:t>13.11.2023</a:t>
             </a:fld>
             <a:endParaRPr lang="de-DE"/>
           </a:p>
@@ -2396,7 +2398,7 @@
           <a:p>
             <a:fld id="{E4780573-CD1C-4620-A951-667904371759}" type="datetimeFigureOut">
               <a:rPr lang="de-DE" smtClean="0"/>
-              <a:t>06.11.2023</a:t>
+              <a:t>13.11.2023</a:t>
             </a:fld>
             <a:endParaRPr lang="de-DE"/>
           </a:p>
@@ -2687,7 +2689,7 @@
           <a:p>
             <a:fld id="{E4780573-CD1C-4620-A951-667904371759}" type="datetimeFigureOut">
               <a:rPr lang="de-DE" smtClean="0"/>
-              <a:t>06.11.2023</a:t>
+              <a:t>13.11.2023</a:t>
             </a:fld>
             <a:endParaRPr lang="de-DE"/>
           </a:p>
@@ -2928,7 +2930,7 @@
           <a:p>
             <a:fld id="{E4780573-CD1C-4620-A951-667904371759}" type="datetimeFigureOut">
               <a:rPr lang="de-DE" smtClean="0"/>
-              <a:t>06.11.2023</a:t>
+              <a:t>13.11.2023</a:t>
             </a:fld>
             <a:endParaRPr lang="de-DE"/>
           </a:p>
@@ -3812,10 +3814,67 @@
           <a:bodyPr/>
           <a:lstStyle/>
           <a:p>
-            <a:endParaRPr lang="de-DE"/>
-          </a:p>
-        </p:txBody>
-      </p:sp>
+            <a:r>
+              <a:rPr lang="de-DE" dirty="0"/>
+              <a:t>Java</a:t>
+            </a:r>
+          </a:p>
+          <a:p>
+            <a:r>
+              <a:rPr lang="de-DE" dirty="0"/>
+              <a:t>Spring Framework</a:t>
+            </a:r>
+          </a:p>
+          <a:p>
+            <a:pPr lvl="1"/>
+            <a:r>
+              <a:rPr lang="de-DE" dirty="0"/>
+              <a:t>Webserver</a:t>
+            </a:r>
+          </a:p>
+          <a:p>
+            <a:pPr lvl="1"/>
+            <a:r>
+              <a:rPr lang="de-DE" dirty="0"/>
+              <a:t>REST-Funktionalitäten</a:t>
+            </a:r>
+          </a:p>
+          <a:p>
+            <a:pPr lvl="1"/>
+            <a:endParaRPr lang="de-DE" dirty="0"/>
+          </a:p>
+        </p:txBody>
+      </p:sp>
+      <p:pic>
+        <p:nvPicPr>
+          <p:cNvPr id="5" name="Grafik 4">
+            <a:extLst>
+              <a:ext uri="{FF2B5EF4-FFF2-40B4-BE49-F238E27FC236}">
+                <a16:creationId xmlns:a16="http://schemas.microsoft.com/office/drawing/2014/main" id="{5D8BAC73-1ECE-988E-5D53-FC1C7F02CC61}"/>
+              </a:ext>
+            </a:extLst>
+          </p:cNvPr>
+          <p:cNvPicPr>
+            <a:picLocks noChangeAspect="1"/>
+          </p:cNvPicPr>
+          <p:nvPr/>
+        </p:nvPicPr>
+        <p:blipFill>
+          <a:blip r:embed="rId2"/>
+          <a:stretch>
+            <a:fillRect/>
+          </a:stretch>
+        </p:blipFill>
+        <p:spPr>
+          <a:xfrm>
+            <a:off x="5143870" y="2401279"/>
+            <a:ext cx="4434574" cy="2055441"/>
+          </a:xfrm>
+          <a:prstGeom prst="rect">
+            <a:avLst/>
+          </a:prstGeom>
+        </p:spPr>
+      </p:pic>
     </p:spTree>
     <p:extLst>
       <p:ext uri="{BB962C8B-B14F-4D97-AF65-F5344CB8AC3E}">
@@ -3851,7 +3910,7 @@
           <p:cNvPr id="2" name="Titel 1">
             <a:extLst>
               <a:ext uri="{FF2B5EF4-FFF2-40B4-BE49-F238E27FC236}">
-                <a16:creationId xmlns:a16="http://schemas.microsoft.com/office/drawing/2014/main" id="{17B5A5C0-8290-7C8E-E367-E97F90DB857A}"/>
+                <a16:creationId xmlns:a16="http://schemas.microsoft.com/office/drawing/2014/main" id="{C990329F-1823-DBF7-D3C1-E6402FE9DEEC}"/>
               </a:ext>
             </a:extLst>
           </p:cNvPr>
@@ -3869,7 +3928,7 @@
           <a:p>
             <a:r>
               <a:rPr lang="de-DE" dirty="0"/>
-              <a:t>Datenbank</a:t>
+              <a:t>REST-API</a:t>
             </a:r>
           </a:p>
         </p:txBody>
@@ -3879,7 +3938,7 @@
           <p:cNvPr id="3" name="Inhaltsplatzhalter 2">
             <a:extLst>
               <a:ext uri="{FF2B5EF4-FFF2-40B4-BE49-F238E27FC236}">
-                <a16:creationId xmlns:a16="http://schemas.microsoft.com/office/drawing/2014/main" id="{17FD410C-4573-DACE-522D-3ADB1E271026}"/>
+                <a16:creationId xmlns:a16="http://schemas.microsoft.com/office/drawing/2014/main" id="{965C8D7A-86D0-AE0E-DE78-F7E325A1754B}"/>
               </a:ext>
             </a:extLst>
           </p:cNvPr>
@@ -3895,14 +3954,182 @@
           <a:bodyPr/>
           <a:lstStyle/>
           <a:p>
-            <a:endParaRPr lang="de-DE"/>
+            <a:pPr marL="457200" lvl="1" indent="0">
+              <a:buNone/>
+            </a:pPr>
+            <a:r>
+              <a:rPr lang="de-DE" sz="3600" dirty="0"/>
+              <a:t>Notation</a:t>
+            </a:r>
+            <a:endParaRPr lang="de-DE" dirty="0"/>
+          </a:p>
+          <a:p>
+            <a:pPr marL="457200" lvl="1" indent="0">
+              <a:buNone/>
+            </a:pPr>
+            <a:endParaRPr lang="de-DE" dirty="0"/>
+          </a:p>
+          <a:p>
+            <a:pPr marL="457200" lvl="1" indent="0">
+              <a:buNone/>
+            </a:pPr>
+            <a:r>
+              <a:rPr lang="de-DE" dirty="0"/>
+              <a:t>GET /</a:t>
+            </a:r>
+            <a:r>
+              <a:rPr lang="de-DE" dirty="0" err="1"/>
+              <a:t>api</a:t>
+            </a:r>
+            <a:r>
+              <a:rPr lang="de-DE" dirty="0"/>
+              <a:t>/v1/</a:t>
+            </a:r>
+            <a:r>
+              <a:rPr lang="de-DE" dirty="0" err="1"/>
+              <a:t>cars</a:t>
+            </a:r>
+            <a:endParaRPr lang="de-DE" dirty="0"/>
+          </a:p>
+          <a:p>
+            <a:pPr marL="457200" lvl="1" indent="0">
+              <a:buNone/>
+            </a:pPr>
+            <a:r>
+              <a:rPr lang="de-DE" dirty="0"/>
+              <a:t>GET /</a:t>
+            </a:r>
+            <a:r>
+              <a:rPr lang="de-DE" dirty="0" err="1"/>
+              <a:t>api</a:t>
+            </a:r>
+            <a:r>
+              <a:rPr lang="de-DE" dirty="0"/>
+              <a:t>/v1/</a:t>
+            </a:r>
+            <a:r>
+              <a:rPr lang="de-DE" dirty="0" err="1"/>
+              <a:t>cars</a:t>
+            </a:r>
+            <a:r>
+              <a:rPr lang="de-DE" dirty="0"/>
+              <a:t>/:</a:t>
+            </a:r>
+            <a:r>
+              <a:rPr lang="de-DE" dirty="0" err="1"/>
+              <a:t>id</a:t>
+            </a:r>
+            <a:endParaRPr lang="de-DE" dirty="0"/>
+          </a:p>
+          <a:p>
+            <a:pPr marL="457200" lvl="1" indent="0">
+              <a:buNone/>
+            </a:pPr>
+            <a:r>
+              <a:rPr lang="de-DE" dirty="0"/>
+              <a:t>GET /</a:t>
+            </a:r>
+            <a:r>
+              <a:rPr lang="de-DE" dirty="0" err="1"/>
+              <a:t>api</a:t>
+            </a:r>
+            <a:r>
+              <a:rPr lang="de-DE" dirty="0"/>
+              <a:t>/v1/</a:t>
+            </a:r>
+            <a:r>
+              <a:rPr lang="de-DE" dirty="0" err="1"/>
+              <a:t>cars</a:t>
+            </a:r>
+            <a:r>
+              <a:rPr lang="de-DE" dirty="0"/>
+              <a:t>/:</a:t>
+            </a:r>
+            <a:r>
+              <a:rPr lang="de-DE" dirty="0" err="1"/>
+              <a:t>id?someFilter</a:t>
+            </a:r>
+            <a:r>
+              <a:rPr lang="de-DE" dirty="0"/>
+              <a:t>=blau</a:t>
+            </a:r>
+          </a:p>
+          <a:p>
+            <a:pPr marL="457200" lvl="1" indent="0">
+              <a:buNone/>
+            </a:pPr>
+            <a:endParaRPr lang="de-DE" dirty="0"/>
+          </a:p>
+          <a:p>
+            <a:pPr marL="457200" lvl="1" indent="0">
+              <a:buNone/>
+            </a:pPr>
+            <a:r>
+              <a:rPr lang="de-DE" dirty="0"/>
+              <a:t>GET /</a:t>
+            </a:r>
+            <a:r>
+              <a:rPr lang="de-DE" dirty="0" err="1"/>
+              <a:t>api</a:t>
+            </a:r>
+            <a:r>
+              <a:rPr lang="de-DE" dirty="0"/>
+              <a:t>/v1/</a:t>
+            </a:r>
+            <a:r>
+              <a:rPr lang="de-DE" dirty="0" err="1"/>
+              <a:t>factories</a:t>
+            </a:r>
+            <a:r>
+              <a:rPr lang="de-DE" dirty="0"/>
+              <a:t>/:</a:t>
+            </a:r>
+            <a:r>
+              <a:rPr lang="de-DE" dirty="0" err="1"/>
+              <a:t>id</a:t>
+            </a:r>
+            <a:r>
+              <a:rPr lang="de-DE" dirty="0"/>
+              <a:t>/</a:t>
+            </a:r>
+            <a:r>
+              <a:rPr lang="de-DE" dirty="0" err="1"/>
+              <a:t>cars</a:t>
+            </a:r>
+            <a:r>
+              <a:rPr lang="de-DE" dirty="0"/>
+              <a:t>/:</a:t>
+            </a:r>
+            <a:r>
+              <a:rPr lang="de-DE" dirty="0" err="1"/>
+              <a:t>id</a:t>
+            </a:r>
+            <a:endParaRPr lang="de-DE" dirty="0"/>
+          </a:p>
+          <a:p>
+            <a:pPr marL="457200" lvl="1" indent="0">
+              <a:buNone/>
+            </a:pPr>
+            <a:endParaRPr lang="de-DE" dirty="0"/>
+          </a:p>
+          <a:p>
+            <a:pPr marL="457200" lvl="1" indent="0">
+              <a:buNone/>
+            </a:pPr>
+            <a:endParaRPr lang="de-DE" dirty="0"/>
+          </a:p>
+          <a:p>
+            <a:pPr marL="457200" lvl="1" indent="0">
+              <a:buNone/>
+            </a:pPr>
+            <a:endParaRPr lang="de-DE" dirty="0"/>
           </a:p>
         </p:txBody>
       </p:sp>
     </p:spTree>
     <p:extLst>
       <p:ext uri="{BB962C8B-B14F-4D97-AF65-F5344CB8AC3E}">
-        <p14:creationId xmlns:p14="http://schemas.microsoft.com/office/powerpoint/2010/main" val="250442459"/>
+        <p14:creationId xmlns:p14="http://schemas.microsoft.com/office/powerpoint/2010/main" val="2529969082"/>
       </p:ext>
     </p:extLst>
   </p:cSld>
@@ -3934,6 +4161,323 @@
           <p:cNvPr id="2" name="Titel 1">
             <a:extLst>
               <a:ext uri="{FF2B5EF4-FFF2-40B4-BE49-F238E27FC236}">
+                <a16:creationId xmlns:a16="http://schemas.microsoft.com/office/drawing/2014/main" id="{C990329F-1823-DBF7-D3C1-E6402FE9DEEC}"/>
+              </a:ext>
+            </a:extLst>
+          </p:cNvPr>
+          <p:cNvSpPr>
+            <a:spLocks noGrp="1"/>
+          </p:cNvSpPr>
+          <p:nvPr>
+            <p:ph type="title"/>
+          </p:nvPr>
+        </p:nvSpPr>
+        <p:spPr/>
+        <p:txBody>
+          <a:bodyPr/>
+          <a:lstStyle/>
+          <a:p>
+            <a:r>
+              <a:rPr lang="de-DE" dirty="0"/>
+              <a:t>REST-API</a:t>
+            </a:r>
+          </a:p>
+        </p:txBody>
+      </p:sp>
+      <p:sp>
+        <p:nvSpPr>
+          <p:cNvPr id="3" name="Inhaltsplatzhalter 2">
+            <a:extLst>
+              <a:ext uri="{FF2B5EF4-FFF2-40B4-BE49-F238E27FC236}">
+                <a16:creationId xmlns:a16="http://schemas.microsoft.com/office/drawing/2014/main" id="{965C8D7A-86D0-AE0E-DE78-F7E325A1754B}"/>
+              </a:ext>
+            </a:extLst>
+          </p:cNvPr>
+          <p:cNvSpPr>
+            <a:spLocks noGrp="1"/>
+          </p:cNvSpPr>
+          <p:nvPr>
+            <p:ph idx="1"/>
+          </p:nvPr>
+        </p:nvSpPr>
+        <p:spPr/>
+        <p:txBody>
+          <a:bodyPr/>
+          <a:lstStyle/>
+          <a:p>
+            <a:pPr marL="457200" lvl="1" indent="0">
+              <a:buNone/>
+            </a:pPr>
+            <a:r>
+              <a:rPr lang="de-DE" dirty="0"/>
+              <a:t>Schnittstellenbeschreibung</a:t>
+            </a:r>
+          </a:p>
+          <a:p>
+            <a:pPr marL="457200" lvl="1" indent="0">
+              <a:buNone/>
+            </a:pPr>
+            <a:endParaRPr lang="de-DE" dirty="0"/>
+          </a:p>
+          <a:p>
+            <a:pPr marL="457200" lvl="1" indent="0">
+              <a:buNone/>
+            </a:pPr>
+            <a:endParaRPr lang="de-DE" dirty="0"/>
+          </a:p>
+          <a:p>
+            <a:pPr marL="457200" lvl="1" indent="0">
+              <a:buNone/>
+            </a:pPr>
+            <a:endParaRPr lang="de-DE" dirty="0"/>
+          </a:p>
+          <a:p>
+            <a:pPr marL="457200" lvl="1" indent="0">
+              <a:buNone/>
+            </a:pPr>
+            <a:endParaRPr lang="de-DE" dirty="0"/>
+          </a:p>
+        </p:txBody>
+      </p:sp>
+    </p:spTree>
+    <p:extLst>
+      <p:ext uri="{BB962C8B-B14F-4D97-AF65-F5344CB8AC3E}">
+        <p14:creationId xmlns:p14="http://schemas.microsoft.com/office/powerpoint/2010/main" val="2208370728"/>
+      </p:ext>
+    </p:extLst>
+  </p:cSld>
+  <p:clrMapOvr>
+    <a:masterClrMapping/>
+  </p:clrMapOvr>
+</p:sld>
+</file>
+
+<file path=ppt/slides/slide17.xml><?xml version="1.0" encoding="utf-8"?>
+<p:sld xmlns:a="http://schemas.openxmlformats.org/drawingml/2006/main" xmlns:r="http://schemas.openxmlformats.org/officeDocument/2006/relationships" xmlns:p="http://schemas.openxmlformats.org/presentationml/2006/main">
+  <p:cSld>
+    <p:spTree>
+      <p:nvGrpSpPr>
+        <p:cNvPr id="1" name=""/>
+        <p:cNvGrpSpPr/>
+        <p:nvPr/>
+      </p:nvGrpSpPr>
+      <p:grpSpPr>
+        <a:xfrm>
+          <a:off x="0" y="0"/>
+          <a:ext cx="0" cy="0"/>
+          <a:chOff x="0" y="0"/>
+          <a:chExt cx="0" cy="0"/>
+        </a:xfrm>
+      </p:grpSpPr>
+      <p:sp>
+        <p:nvSpPr>
+          <p:cNvPr id="2" name="Titel 1">
+            <a:extLst>
+              <a:ext uri="{FF2B5EF4-FFF2-40B4-BE49-F238E27FC236}">
+                <a16:creationId xmlns:a16="http://schemas.microsoft.com/office/drawing/2014/main" id="{17B5A5C0-8290-7C8E-E367-E97F90DB857A}"/>
+              </a:ext>
+            </a:extLst>
+          </p:cNvPr>
+          <p:cNvSpPr>
+            <a:spLocks noGrp="1"/>
+          </p:cNvSpPr>
+          <p:nvPr>
+            <p:ph type="title"/>
+          </p:nvPr>
+        </p:nvSpPr>
+        <p:spPr/>
+        <p:txBody>
+          <a:bodyPr/>
+          <a:lstStyle/>
+          <a:p>
+            <a:r>
+              <a:rPr lang="de-DE" dirty="0"/>
+              <a:t>Datenbank</a:t>
+            </a:r>
+          </a:p>
+        </p:txBody>
+      </p:sp>
+      <p:pic>
+        <p:nvPicPr>
+          <p:cNvPr id="5" name="Inhaltsplatzhalter 4" descr="Ein Bild, das Text, Screenshot, Diagramm, Reihe enthält.&#10;&#10;Automatisch generierte Beschreibung">
+            <a:extLst>
+              <a:ext uri="{FF2B5EF4-FFF2-40B4-BE49-F238E27FC236}">
+                <a16:creationId xmlns:a16="http://schemas.microsoft.com/office/drawing/2014/main" id="{E2DFDDB2-3998-78C3-9B8A-F8217EE22549}"/>
+              </a:ext>
+            </a:extLst>
+          </p:cNvPr>
+          <p:cNvPicPr>
+            <a:picLocks noGrp="1" noChangeAspect="1"/>
+          </p:cNvPicPr>
+          <p:nvPr>
+            <p:ph idx="1"/>
+          </p:nvPr>
+        </p:nvPicPr>
+        <p:blipFill>
+          <a:blip r:embed="rId2">
+            <a:extLst>
+              <a:ext uri="{28A0092B-C50C-407E-A947-70E740481C1C}">
+                <a14:useLocalDpi xmlns:a14="http://schemas.microsoft.com/office/drawing/2010/main" val="0"/>
+              </a:ext>
+            </a:extLst>
+          </a:blip>
+          <a:stretch>
+            <a:fillRect/>
+          </a:stretch>
+        </p:blipFill>
+        <p:spPr>
+          <a:xfrm>
+            <a:off x="6760368" y="3034506"/>
+            <a:ext cx="3343275" cy="2009775"/>
+          </a:xfrm>
+        </p:spPr>
+      </p:pic>
+      <p:pic>
+        <p:nvPicPr>
+          <p:cNvPr id="7" name="Grafik 6" descr="Ein Bild, das Text, Diagramm, Reihe, Screenshot enthält.&#10;&#10;Automatisch generierte Beschreibung">
+            <a:extLst>
+              <a:ext uri="{FF2B5EF4-FFF2-40B4-BE49-F238E27FC236}">
+                <a16:creationId xmlns:a16="http://schemas.microsoft.com/office/drawing/2014/main" id="{ECA87B96-2A44-4F1F-24DD-A53020E51B1D}"/>
+              </a:ext>
+            </a:extLst>
+          </p:cNvPr>
+          <p:cNvPicPr>
+            <a:picLocks noChangeAspect="1"/>
+          </p:cNvPicPr>
+          <p:nvPr/>
+        </p:nvPicPr>
+        <p:blipFill>
+          <a:blip r:embed="rId3">
+            <a:extLst>
+              <a:ext uri="{28A0092B-C50C-407E-A947-70E740481C1C}">
+                <a14:useLocalDpi xmlns:a14="http://schemas.microsoft.com/office/drawing/2010/main" val="0"/>
+              </a:ext>
+            </a:extLst>
+          </a:blip>
+          <a:stretch>
+            <a:fillRect/>
+          </a:stretch>
+        </p:blipFill>
+        <p:spPr>
+          <a:xfrm>
+            <a:off x="633412" y="3034506"/>
+            <a:ext cx="5057775" cy="1628775"/>
+          </a:xfrm>
+          <a:prstGeom prst="rect">
+            <a:avLst/>
+          </a:prstGeom>
+        </p:spPr>
+      </p:pic>
+      <p:sp>
+        <p:nvSpPr>
+          <p:cNvPr id="9" name="Textfeld 8">
+            <a:extLst>
+              <a:ext uri="{FF2B5EF4-FFF2-40B4-BE49-F238E27FC236}">
+                <a16:creationId xmlns:a16="http://schemas.microsoft.com/office/drawing/2014/main" id="{8F8BC405-39C8-DE1D-4EA0-BB6646F90D2E}"/>
+              </a:ext>
+            </a:extLst>
+          </p:cNvPr>
+          <p:cNvSpPr txBox="1"/>
+          <p:nvPr/>
+        </p:nvSpPr>
+        <p:spPr>
+          <a:xfrm>
+            <a:off x="6760368" y="2665174"/>
+            <a:ext cx="1580882" cy="369332"/>
+          </a:xfrm>
+          <a:prstGeom prst="rect">
+            <a:avLst/>
+          </a:prstGeom>
+          <a:noFill/>
+        </p:spPr>
+        <p:txBody>
+          <a:bodyPr wrap="none" rtlCol="0">
+            <a:spAutoFit/>
+          </a:bodyPr>
+          <a:lstStyle/>
+          <a:p>
+            <a:r>
+              <a:rPr lang="de-DE" dirty="0"/>
+              <a:t>Sensor Daten</a:t>
+            </a:r>
+          </a:p>
+        </p:txBody>
+      </p:sp>
+      <p:sp>
+        <p:nvSpPr>
+          <p:cNvPr id="10" name="Textfeld 9">
+            <a:extLst>
+              <a:ext uri="{FF2B5EF4-FFF2-40B4-BE49-F238E27FC236}">
+                <a16:creationId xmlns:a16="http://schemas.microsoft.com/office/drawing/2014/main" id="{4061C66C-CB3D-F9F1-E9A8-8E80442F1A9A}"/>
+              </a:ext>
+            </a:extLst>
+          </p:cNvPr>
+          <p:cNvSpPr txBox="1"/>
+          <p:nvPr/>
+        </p:nvSpPr>
+        <p:spPr>
+          <a:xfrm>
+            <a:off x="633412" y="2665174"/>
+            <a:ext cx="2438488" cy="369332"/>
+          </a:xfrm>
+          <a:prstGeom prst="rect">
+            <a:avLst/>
+          </a:prstGeom>
+          <a:noFill/>
+        </p:spPr>
+        <p:txBody>
+          <a:bodyPr wrap="none" rtlCol="0">
+            <a:spAutoFit/>
+          </a:bodyPr>
+          <a:lstStyle/>
+          <a:p>
+            <a:r>
+              <a:rPr lang="de-DE" dirty="0"/>
+              <a:t>Wecker </a:t>
+            </a:r>
+            <a:r>
+              <a:rPr lang="de-DE" dirty="0" err="1"/>
+              <a:t>Configuration</a:t>
+            </a:r>
+            <a:endParaRPr lang="de-DE" dirty="0"/>
+          </a:p>
+        </p:txBody>
+      </p:sp>
+    </p:spTree>
+    <p:extLst>
+      <p:ext uri="{BB962C8B-B14F-4D97-AF65-F5344CB8AC3E}">
+        <p14:creationId xmlns:p14="http://schemas.microsoft.com/office/powerpoint/2010/main" val="250442459"/>
+      </p:ext>
+    </p:extLst>
+  </p:cSld>
+  <p:clrMapOvr>
+    <a:masterClrMapping/>
+  </p:clrMapOvr>
+</p:sld>
+</file>
+
+<file path=ppt/slides/slide18.xml><?xml version="1.0" encoding="utf-8"?>
+<p:sld xmlns:a="http://schemas.openxmlformats.org/drawingml/2006/main" xmlns:r="http://schemas.openxmlformats.org/officeDocument/2006/relationships" xmlns:p="http://schemas.openxmlformats.org/presentationml/2006/main">
+  <p:cSld>
+    <p:spTree>
+      <p:nvGrpSpPr>
+        <p:cNvPr id="1" name=""/>
+        <p:cNvGrpSpPr/>
+        <p:nvPr/>
+      </p:nvGrpSpPr>
+      <p:grpSpPr>
+        <a:xfrm>
+          <a:off x="0" y="0"/>
+          <a:ext cx="0" cy="0"/>
+          <a:chOff x="0" y="0"/>
+          <a:chExt cx="0" cy="0"/>
+        </a:xfrm>
+      </p:grpSpPr>
+      <p:sp>
+        <p:nvSpPr>
+          <p:cNvPr id="2" name="Titel 1">
+            <a:extLst>
+              <a:ext uri="{FF2B5EF4-FFF2-40B4-BE49-F238E27FC236}">
                 <a16:creationId xmlns:a16="http://schemas.microsoft.com/office/drawing/2014/main" id="{FFB40984-BB98-B724-3C7A-4010A921A6B3}"/>
               </a:ext>
             </a:extLst>
@@ -3995,7 +4539,7 @@
 </p:sld>
 </file>
 
-<file path=ppt/slides/slide17.xml><?xml version="1.0" encoding="utf-8"?>
+<file path=ppt/slides/slide19.xml><?xml version="1.0" encoding="utf-8"?>
 <p:sld xmlns:a="http://schemas.openxmlformats.org/drawingml/2006/main" xmlns:r="http://schemas.openxmlformats.org/officeDocument/2006/relationships" xmlns:p="http://schemas.openxmlformats.org/presentationml/2006/main">
   <p:cSld>
     <p:spTree>

</xml_diff>